<commit_message>
Extracted TensorFlow intro slide
</commit_message>
<xml_diff>
--- a/Python/python_intro_gan.pptx
+++ b/Python/python_intro_gan.pptx
@@ -5,10 +5,11 @@
     <p:sldMasterId id="2147483648" r:id="rId1"/>
   </p:sldMasterIdLst>
   <p:sldIdLst>
-    <p:sldId id="256" r:id="rId2"/>
-    <p:sldId id="257" r:id="rId3"/>
-    <p:sldId id="258" r:id="rId4"/>
-    <p:sldId id="259" r:id="rId5"/>
+    <p:sldId id="260" r:id="rId2"/>
+    <p:sldId id="256" r:id="rId3"/>
+    <p:sldId id="257" r:id="rId4"/>
+    <p:sldId id="258" r:id="rId5"/>
+    <p:sldId id="259" r:id="rId6"/>
   </p:sldIdLst>
   <p:sldSz cx="12192000" cy="6858000"/>
   <p:notesSz cx="6858000" cy="9144000"/>
@@ -107,6 +108,11 @@
       </a:defRPr>
     </a:lvl9pPr>
   </p:defaultTextStyle>
+  <p:extLst>
+    <p:ext uri="{EFAFB233-063F-42B5-8137-9DF3F51BA10A}">
+      <p15:sldGuideLst xmlns:p15="http://schemas.microsoft.com/office/powerpoint/2012/main"/>
+    </p:ext>
+  </p:extLst>
 </p:presentation>
 </file>
 
@@ -2983,6 +2989,704 @@
           <a:lstStyle/>
           <a:p>
             <a:r>
+              <a:rPr lang="en-US" dirty="0" err="1" smtClean="0"/>
+              <a:t>TensorFlow</a:t>
+            </a:r>
+            <a:endParaRPr lang="en-US" dirty="0"/>
+          </a:p>
+        </p:txBody>
+      </p:sp>
+      <p:sp>
+        <p:nvSpPr>
+          <p:cNvPr id="3" name="Content Placeholder 2"/>
+          <p:cNvSpPr>
+            <a:spLocks noGrp="1"/>
+          </p:cNvSpPr>
+          <p:nvPr>
+            <p:ph idx="1"/>
+          </p:nvPr>
+        </p:nvSpPr>
+        <p:spPr/>
+        <p:txBody>
+          <a:bodyPr>
+            <a:normAutofit lnSpcReduction="10000"/>
+          </a:bodyPr>
+          <a:lstStyle/>
+          <a:p>
+            <a:r>
+              <a:rPr lang="en-US" dirty="0" smtClean="0"/>
+              <a:t>Developed by Google</a:t>
+            </a:r>
+          </a:p>
+          <a:p>
+            <a:r>
+              <a:rPr lang="en-US" dirty="0" smtClean="0"/>
+              <a:t>Wide acceptance</a:t>
+            </a:r>
+          </a:p>
+          <a:p>
+            <a:r>
+              <a:rPr lang="en-US" dirty="0" smtClean="0"/>
+              <a:t>Many algorithms &amp; architectures</a:t>
+            </a:r>
+          </a:p>
+          <a:p>
+            <a:pPr lvl="1"/>
+            <a:r>
+              <a:rPr lang="en-US" dirty="0" smtClean="0"/>
+              <a:t>"classic" deep neural networks</a:t>
+            </a:r>
+          </a:p>
+          <a:p>
+            <a:pPr lvl="1"/>
+            <a:r>
+              <a:rPr lang="en-US" dirty="0"/>
+              <a:t>c</a:t>
+            </a:r>
+            <a:r>
+              <a:rPr lang="en-US" dirty="0" smtClean="0"/>
+              <a:t>onvolutional neural networks</a:t>
+            </a:r>
+          </a:p>
+          <a:p>
+            <a:pPr lvl="1"/>
+            <a:r>
+              <a:rPr lang="en-US" dirty="0"/>
+              <a:t>r</a:t>
+            </a:r>
+            <a:r>
+              <a:rPr lang="en-US" dirty="0" smtClean="0"/>
+              <a:t>ecurrent neural networks</a:t>
+            </a:r>
+          </a:p>
+          <a:p>
+            <a:r>
+              <a:rPr lang="en-US" dirty="0" smtClean="0"/>
+              <a:t>Essentially execution of dataflow network</a:t>
+            </a:r>
+          </a:p>
+          <a:p>
+            <a:pPr lvl="1"/>
+            <a:r>
+              <a:rPr lang="en-US" dirty="0" smtClean="0"/>
+              <a:t>allows for optimization</a:t>
+            </a:r>
+          </a:p>
+          <a:p>
+            <a:pPr lvl="1"/>
+            <a:r>
+              <a:rPr lang="en-US" dirty="0" smtClean="0"/>
+              <a:t>distribute work over CPU(s), GPU(s)</a:t>
+            </a:r>
+          </a:p>
+          <a:p>
+            <a:r>
+              <a:rPr lang="en-US" dirty="0" smtClean="0"/>
+              <a:t>Layer under higher-level frameworks, e.g., </a:t>
+            </a:r>
+            <a:r>
+              <a:rPr lang="en-US" dirty="0" err="1" smtClean="0"/>
+              <a:t>Keras</a:t>
+            </a:r>
+            <a:endParaRPr lang="en-US" dirty="0" smtClean="0"/>
+          </a:p>
+        </p:txBody>
+      </p:sp>
+      <p:sp>
+        <p:nvSpPr>
+          <p:cNvPr id="4" name="Slide Number Placeholder 3"/>
+          <p:cNvSpPr>
+            <a:spLocks noGrp="1"/>
+          </p:cNvSpPr>
+          <p:nvPr>
+            <p:ph type="sldNum" sz="quarter" idx="12"/>
+          </p:nvPr>
+        </p:nvSpPr>
+        <p:spPr/>
+        <p:txBody>
+          <a:bodyPr/>
+          <a:lstStyle/>
+          <a:p>
+            <a:fld id="{5A209D72-2E9D-49B0-8977-41DCCC66C0BB}" type="slidenum">
+              <a:rPr lang="nl-BE" smtClean="0"/>
+              <a:t>1</a:t>
+            </a:fld>
+            <a:endParaRPr lang="nl-BE"/>
+          </a:p>
+        </p:txBody>
+      </p:sp>
+    </p:spTree>
+    <p:extLst>
+      <p:ext uri="{BB962C8B-B14F-4D97-AF65-F5344CB8AC3E}">
+        <p14:creationId xmlns:p14="http://schemas.microsoft.com/office/powerpoint/2010/main" val="2931324193"/>
+      </p:ext>
+    </p:extLst>
+  </p:cSld>
+  <p:clrMapOvr>
+    <a:masterClrMapping/>
+  </p:clrMapOvr>
+  <p:timing>
+    <p:tnLst>
+      <p:par>
+        <p:cTn id="1" dur="indefinite" restart="never" nodeType="tmRoot">
+          <p:childTnLst>
+            <p:seq concurrent="1" nextAc="seek">
+              <p:cTn id="2" dur="indefinite" nodeType="mainSeq">
+                <p:childTnLst>
+                  <p:par>
+                    <p:cTn id="3" fill="hold">
+                      <p:stCondLst>
+                        <p:cond delay="indefinite"/>
+                        <p:cond evt="onBegin" delay="0">
+                          <p:tn val="2"/>
+                        </p:cond>
+                      </p:stCondLst>
+                      <p:childTnLst>
+                        <p:par>
+                          <p:cTn id="4" fill="hold">
+                            <p:stCondLst>
+                              <p:cond delay="0"/>
+                            </p:stCondLst>
+                            <p:childTnLst>
+                              <p:par>
+                                <p:cTn id="5" presetID="1" presetClass="entr" presetSubtype="0" fill="hold" grpId="0" nodeType="withEffect">
+                                  <p:stCondLst>
+                                    <p:cond delay="0"/>
+                                  </p:stCondLst>
+                                  <p:childTnLst>
+                                    <p:set>
+                                      <p:cBhvr>
+                                        <p:cTn id="6" dur="1" fill="hold">
+                                          <p:stCondLst>
+                                            <p:cond delay="0"/>
+                                          </p:stCondLst>
+                                        </p:cTn>
+                                        <p:tgtEl>
+                                          <p:spTgt spid="3">
+                                            <p:txEl>
+                                              <p:pRg st="0" end="0"/>
+                                            </p:txEl>
+                                          </p:spTgt>
+                                        </p:tgtEl>
+                                        <p:attrNameLst>
+                                          <p:attrName>style.visibility</p:attrName>
+                                        </p:attrNameLst>
+                                      </p:cBhvr>
+                                      <p:to>
+                                        <p:strVal val="visible"/>
+                                      </p:to>
+                                    </p:set>
+                                  </p:childTnLst>
+                                </p:cTn>
+                              </p:par>
+                            </p:childTnLst>
+                          </p:cTn>
+                        </p:par>
+                      </p:childTnLst>
+                    </p:cTn>
+                  </p:par>
+                  <p:par>
+                    <p:cTn id="7" fill="hold">
+                      <p:stCondLst>
+                        <p:cond delay="indefinite"/>
+                      </p:stCondLst>
+                      <p:childTnLst>
+                        <p:par>
+                          <p:cTn id="8" fill="hold">
+                            <p:stCondLst>
+                              <p:cond delay="0"/>
+                            </p:stCondLst>
+                            <p:childTnLst>
+                              <p:par>
+                                <p:cTn id="9" presetID="1" presetClass="entr" presetSubtype="0" fill="hold" grpId="0" nodeType="clickEffect">
+                                  <p:stCondLst>
+                                    <p:cond delay="0"/>
+                                  </p:stCondLst>
+                                  <p:childTnLst>
+                                    <p:set>
+                                      <p:cBhvr>
+                                        <p:cTn id="10" dur="1" fill="hold">
+                                          <p:stCondLst>
+                                            <p:cond delay="0"/>
+                                          </p:stCondLst>
+                                        </p:cTn>
+                                        <p:tgtEl>
+                                          <p:spTgt spid="3">
+                                            <p:txEl>
+                                              <p:pRg st="1" end="1"/>
+                                            </p:txEl>
+                                          </p:spTgt>
+                                        </p:tgtEl>
+                                        <p:attrNameLst>
+                                          <p:attrName>style.visibility</p:attrName>
+                                        </p:attrNameLst>
+                                      </p:cBhvr>
+                                      <p:to>
+                                        <p:strVal val="visible"/>
+                                      </p:to>
+                                    </p:set>
+                                  </p:childTnLst>
+                                </p:cTn>
+                              </p:par>
+                            </p:childTnLst>
+                          </p:cTn>
+                        </p:par>
+                      </p:childTnLst>
+                    </p:cTn>
+                  </p:par>
+                  <p:par>
+                    <p:cTn id="11" fill="hold">
+                      <p:stCondLst>
+                        <p:cond delay="indefinite"/>
+                      </p:stCondLst>
+                      <p:childTnLst>
+                        <p:par>
+                          <p:cTn id="12" fill="hold">
+                            <p:stCondLst>
+                              <p:cond delay="0"/>
+                            </p:stCondLst>
+                            <p:childTnLst>
+                              <p:par>
+                                <p:cTn id="13" presetID="1" presetClass="entr" presetSubtype="0" fill="hold" grpId="0" nodeType="clickEffect">
+                                  <p:stCondLst>
+                                    <p:cond delay="0"/>
+                                  </p:stCondLst>
+                                  <p:childTnLst>
+                                    <p:set>
+                                      <p:cBhvr>
+                                        <p:cTn id="14" dur="1" fill="hold">
+                                          <p:stCondLst>
+                                            <p:cond delay="0"/>
+                                          </p:stCondLst>
+                                        </p:cTn>
+                                        <p:tgtEl>
+                                          <p:spTgt spid="3">
+                                            <p:txEl>
+                                              <p:pRg st="2" end="2"/>
+                                            </p:txEl>
+                                          </p:spTgt>
+                                        </p:tgtEl>
+                                        <p:attrNameLst>
+                                          <p:attrName>style.visibility</p:attrName>
+                                        </p:attrNameLst>
+                                      </p:cBhvr>
+                                      <p:to>
+                                        <p:strVal val="visible"/>
+                                      </p:to>
+                                    </p:set>
+                                  </p:childTnLst>
+                                </p:cTn>
+                              </p:par>
+                            </p:childTnLst>
+                          </p:cTn>
+                        </p:par>
+                      </p:childTnLst>
+                    </p:cTn>
+                  </p:par>
+                  <p:par>
+                    <p:cTn id="15" fill="hold">
+                      <p:stCondLst>
+                        <p:cond delay="indefinite"/>
+                      </p:stCondLst>
+                      <p:childTnLst>
+                        <p:par>
+                          <p:cTn id="16" fill="hold">
+                            <p:stCondLst>
+                              <p:cond delay="0"/>
+                            </p:stCondLst>
+                            <p:childTnLst>
+                              <p:par>
+                                <p:cTn id="17" presetID="1" presetClass="entr" presetSubtype="0" fill="hold" grpId="0" nodeType="clickEffect">
+                                  <p:stCondLst>
+                                    <p:cond delay="0"/>
+                                  </p:stCondLst>
+                                  <p:childTnLst>
+                                    <p:set>
+                                      <p:cBhvr>
+                                        <p:cTn id="18" dur="1" fill="hold">
+                                          <p:stCondLst>
+                                            <p:cond delay="0"/>
+                                          </p:stCondLst>
+                                        </p:cTn>
+                                        <p:tgtEl>
+                                          <p:spTgt spid="3">
+                                            <p:txEl>
+                                              <p:pRg st="3" end="3"/>
+                                            </p:txEl>
+                                          </p:spTgt>
+                                        </p:tgtEl>
+                                        <p:attrNameLst>
+                                          <p:attrName>style.visibility</p:attrName>
+                                        </p:attrNameLst>
+                                      </p:cBhvr>
+                                      <p:to>
+                                        <p:strVal val="visible"/>
+                                      </p:to>
+                                    </p:set>
+                                  </p:childTnLst>
+                                </p:cTn>
+                              </p:par>
+                            </p:childTnLst>
+                          </p:cTn>
+                        </p:par>
+                      </p:childTnLst>
+                    </p:cTn>
+                  </p:par>
+                  <p:par>
+                    <p:cTn id="19" fill="hold">
+                      <p:stCondLst>
+                        <p:cond delay="indefinite"/>
+                      </p:stCondLst>
+                      <p:childTnLst>
+                        <p:par>
+                          <p:cTn id="20" fill="hold">
+                            <p:stCondLst>
+                              <p:cond delay="0"/>
+                            </p:stCondLst>
+                            <p:childTnLst>
+                              <p:par>
+                                <p:cTn id="21" presetID="1" presetClass="entr" presetSubtype="0" fill="hold" grpId="0" nodeType="clickEffect">
+                                  <p:stCondLst>
+                                    <p:cond delay="0"/>
+                                  </p:stCondLst>
+                                  <p:childTnLst>
+                                    <p:set>
+                                      <p:cBhvr>
+                                        <p:cTn id="22" dur="1" fill="hold">
+                                          <p:stCondLst>
+                                            <p:cond delay="0"/>
+                                          </p:stCondLst>
+                                        </p:cTn>
+                                        <p:tgtEl>
+                                          <p:spTgt spid="3">
+                                            <p:txEl>
+                                              <p:pRg st="4" end="4"/>
+                                            </p:txEl>
+                                          </p:spTgt>
+                                        </p:tgtEl>
+                                        <p:attrNameLst>
+                                          <p:attrName>style.visibility</p:attrName>
+                                        </p:attrNameLst>
+                                      </p:cBhvr>
+                                      <p:to>
+                                        <p:strVal val="visible"/>
+                                      </p:to>
+                                    </p:set>
+                                  </p:childTnLst>
+                                </p:cTn>
+                              </p:par>
+                            </p:childTnLst>
+                          </p:cTn>
+                        </p:par>
+                      </p:childTnLst>
+                    </p:cTn>
+                  </p:par>
+                  <p:par>
+                    <p:cTn id="23" fill="hold">
+                      <p:stCondLst>
+                        <p:cond delay="indefinite"/>
+                      </p:stCondLst>
+                      <p:childTnLst>
+                        <p:par>
+                          <p:cTn id="24" fill="hold">
+                            <p:stCondLst>
+                              <p:cond delay="0"/>
+                            </p:stCondLst>
+                            <p:childTnLst>
+                              <p:par>
+                                <p:cTn id="25" presetID="1" presetClass="entr" presetSubtype="0" fill="hold" grpId="0" nodeType="clickEffect">
+                                  <p:stCondLst>
+                                    <p:cond delay="0"/>
+                                  </p:stCondLst>
+                                  <p:childTnLst>
+                                    <p:set>
+                                      <p:cBhvr>
+                                        <p:cTn id="26" dur="1" fill="hold">
+                                          <p:stCondLst>
+                                            <p:cond delay="0"/>
+                                          </p:stCondLst>
+                                        </p:cTn>
+                                        <p:tgtEl>
+                                          <p:spTgt spid="3">
+                                            <p:txEl>
+                                              <p:pRg st="5" end="5"/>
+                                            </p:txEl>
+                                          </p:spTgt>
+                                        </p:tgtEl>
+                                        <p:attrNameLst>
+                                          <p:attrName>style.visibility</p:attrName>
+                                        </p:attrNameLst>
+                                      </p:cBhvr>
+                                      <p:to>
+                                        <p:strVal val="visible"/>
+                                      </p:to>
+                                    </p:set>
+                                  </p:childTnLst>
+                                </p:cTn>
+                              </p:par>
+                            </p:childTnLst>
+                          </p:cTn>
+                        </p:par>
+                      </p:childTnLst>
+                    </p:cTn>
+                  </p:par>
+                  <p:par>
+                    <p:cTn id="27" fill="hold">
+                      <p:stCondLst>
+                        <p:cond delay="indefinite"/>
+                      </p:stCondLst>
+                      <p:childTnLst>
+                        <p:par>
+                          <p:cTn id="28" fill="hold">
+                            <p:stCondLst>
+                              <p:cond delay="0"/>
+                            </p:stCondLst>
+                            <p:childTnLst>
+                              <p:par>
+                                <p:cTn id="29" presetID="1" presetClass="entr" presetSubtype="0" fill="hold" grpId="0" nodeType="clickEffect">
+                                  <p:stCondLst>
+                                    <p:cond delay="0"/>
+                                  </p:stCondLst>
+                                  <p:childTnLst>
+                                    <p:set>
+                                      <p:cBhvr>
+                                        <p:cTn id="30" dur="1" fill="hold">
+                                          <p:stCondLst>
+                                            <p:cond delay="0"/>
+                                          </p:stCondLst>
+                                        </p:cTn>
+                                        <p:tgtEl>
+                                          <p:spTgt spid="3">
+                                            <p:txEl>
+                                              <p:pRg st="6" end="6"/>
+                                            </p:txEl>
+                                          </p:spTgt>
+                                        </p:tgtEl>
+                                        <p:attrNameLst>
+                                          <p:attrName>style.visibility</p:attrName>
+                                        </p:attrNameLst>
+                                      </p:cBhvr>
+                                      <p:to>
+                                        <p:strVal val="visible"/>
+                                      </p:to>
+                                    </p:set>
+                                  </p:childTnLst>
+                                </p:cTn>
+                              </p:par>
+                            </p:childTnLst>
+                          </p:cTn>
+                        </p:par>
+                      </p:childTnLst>
+                    </p:cTn>
+                  </p:par>
+                  <p:par>
+                    <p:cTn id="31" fill="hold">
+                      <p:stCondLst>
+                        <p:cond delay="indefinite"/>
+                      </p:stCondLst>
+                      <p:childTnLst>
+                        <p:par>
+                          <p:cTn id="32" fill="hold">
+                            <p:stCondLst>
+                              <p:cond delay="0"/>
+                            </p:stCondLst>
+                            <p:childTnLst>
+                              <p:par>
+                                <p:cTn id="33" presetID="1" presetClass="entr" presetSubtype="0" fill="hold" grpId="0" nodeType="clickEffect">
+                                  <p:stCondLst>
+                                    <p:cond delay="0"/>
+                                  </p:stCondLst>
+                                  <p:childTnLst>
+                                    <p:set>
+                                      <p:cBhvr>
+                                        <p:cTn id="34" dur="1" fill="hold">
+                                          <p:stCondLst>
+                                            <p:cond delay="0"/>
+                                          </p:stCondLst>
+                                        </p:cTn>
+                                        <p:tgtEl>
+                                          <p:spTgt spid="3">
+                                            <p:txEl>
+                                              <p:pRg st="7" end="7"/>
+                                            </p:txEl>
+                                          </p:spTgt>
+                                        </p:tgtEl>
+                                        <p:attrNameLst>
+                                          <p:attrName>style.visibility</p:attrName>
+                                        </p:attrNameLst>
+                                      </p:cBhvr>
+                                      <p:to>
+                                        <p:strVal val="visible"/>
+                                      </p:to>
+                                    </p:set>
+                                  </p:childTnLst>
+                                </p:cTn>
+                              </p:par>
+                            </p:childTnLst>
+                          </p:cTn>
+                        </p:par>
+                      </p:childTnLst>
+                    </p:cTn>
+                  </p:par>
+                  <p:par>
+                    <p:cTn id="35" fill="hold">
+                      <p:stCondLst>
+                        <p:cond delay="indefinite"/>
+                      </p:stCondLst>
+                      <p:childTnLst>
+                        <p:par>
+                          <p:cTn id="36" fill="hold">
+                            <p:stCondLst>
+                              <p:cond delay="0"/>
+                            </p:stCondLst>
+                            <p:childTnLst>
+                              <p:par>
+                                <p:cTn id="37" presetID="1" presetClass="entr" presetSubtype="0" fill="hold" grpId="0" nodeType="clickEffect">
+                                  <p:stCondLst>
+                                    <p:cond delay="0"/>
+                                  </p:stCondLst>
+                                  <p:childTnLst>
+                                    <p:set>
+                                      <p:cBhvr>
+                                        <p:cTn id="38" dur="1" fill="hold">
+                                          <p:stCondLst>
+                                            <p:cond delay="0"/>
+                                          </p:stCondLst>
+                                        </p:cTn>
+                                        <p:tgtEl>
+                                          <p:spTgt spid="3">
+                                            <p:txEl>
+                                              <p:pRg st="8" end="8"/>
+                                            </p:txEl>
+                                          </p:spTgt>
+                                        </p:tgtEl>
+                                        <p:attrNameLst>
+                                          <p:attrName>style.visibility</p:attrName>
+                                        </p:attrNameLst>
+                                      </p:cBhvr>
+                                      <p:to>
+                                        <p:strVal val="visible"/>
+                                      </p:to>
+                                    </p:set>
+                                  </p:childTnLst>
+                                </p:cTn>
+                              </p:par>
+                            </p:childTnLst>
+                          </p:cTn>
+                        </p:par>
+                      </p:childTnLst>
+                    </p:cTn>
+                  </p:par>
+                  <p:par>
+                    <p:cTn id="39" fill="hold">
+                      <p:stCondLst>
+                        <p:cond delay="indefinite"/>
+                      </p:stCondLst>
+                      <p:childTnLst>
+                        <p:par>
+                          <p:cTn id="40" fill="hold">
+                            <p:stCondLst>
+                              <p:cond delay="0"/>
+                            </p:stCondLst>
+                            <p:childTnLst>
+                              <p:par>
+                                <p:cTn id="41" presetID="1" presetClass="entr" presetSubtype="0" fill="hold" grpId="0" nodeType="clickEffect">
+                                  <p:stCondLst>
+                                    <p:cond delay="0"/>
+                                  </p:stCondLst>
+                                  <p:childTnLst>
+                                    <p:set>
+                                      <p:cBhvr>
+                                        <p:cTn id="42" dur="1" fill="hold">
+                                          <p:stCondLst>
+                                            <p:cond delay="0"/>
+                                          </p:stCondLst>
+                                        </p:cTn>
+                                        <p:tgtEl>
+                                          <p:spTgt spid="3">
+                                            <p:txEl>
+                                              <p:pRg st="9" end="9"/>
+                                            </p:txEl>
+                                          </p:spTgt>
+                                        </p:tgtEl>
+                                        <p:attrNameLst>
+                                          <p:attrName>style.visibility</p:attrName>
+                                        </p:attrNameLst>
+                                      </p:cBhvr>
+                                      <p:to>
+                                        <p:strVal val="visible"/>
+                                      </p:to>
+                                    </p:set>
+                                  </p:childTnLst>
+                                </p:cTn>
+                              </p:par>
+                            </p:childTnLst>
+                          </p:cTn>
+                        </p:par>
+                      </p:childTnLst>
+                    </p:cTn>
+                  </p:par>
+                </p:childTnLst>
+              </p:cTn>
+              <p:prevCondLst>
+                <p:cond evt="onPrev" delay="0">
+                  <p:tgtEl>
+                    <p:sldTgt/>
+                  </p:tgtEl>
+                </p:cond>
+              </p:prevCondLst>
+              <p:nextCondLst>
+                <p:cond evt="onNext" delay="0">
+                  <p:tgtEl>
+                    <p:sldTgt/>
+                  </p:tgtEl>
+                </p:cond>
+              </p:nextCondLst>
+            </p:seq>
+          </p:childTnLst>
+        </p:cTn>
+      </p:par>
+    </p:tnLst>
+    <p:bldLst>
+      <p:bldP spid="3" grpId="0" build="p" bldLvl="2"/>
+    </p:bldLst>
+  </p:timing>
+</p:sld>
+</file>
+
+<file path=ppt/slides/slide2.xml><?xml version="1.0" encoding="utf-8"?>
+<p:sld xmlns:a="http://schemas.openxmlformats.org/drawingml/2006/main" xmlns:r="http://schemas.openxmlformats.org/officeDocument/2006/relationships" xmlns:p="http://schemas.openxmlformats.org/presentationml/2006/main">
+  <p:cSld>
+    <p:spTree>
+      <p:nvGrpSpPr>
+        <p:cNvPr id="1" name=""/>
+        <p:cNvGrpSpPr/>
+        <p:nvPr/>
+      </p:nvGrpSpPr>
+      <p:grpSpPr>
+        <a:xfrm>
+          <a:off x="0" y="0"/>
+          <a:ext cx="0" cy="0"/>
+          <a:chOff x="0" y="0"/>
+          <a:chExt cx="0" cy="0"/>
+        </a:xfrm>
+      </p:grpSpPr>
+      <p:sp>
+        <p:nvSpPr>
+          <p:cNvPr id="2" name="Title 1"/>
+          <p:cNvSpPr>
+            <a:spLocks noGrp="1"/>
+          </p:cNvSpPr>
+          <p:nvPr>
+            <p:ph type="title"/>
+          </p:nvPr>
+        </p:nvSpPr>
+        <p:spPr/>
+        <p:txBody>
+          <a:bodyPr/>
+          <a:lstStyle/>
+          <a:p>
+            <a:r>
               <a:rPr lang="en-US" dirty="0" smtClean="0"/>
               <a:t>Task 4</a:t>
             </a:r>
@@ -3083,7 +3787,7 @@
           <a:p>
             <a:fld id="{5A209D72-2E9D-49B0-8977-41DCCC66C0BB}" type="slidenum">
               <a:rPr lang="nl-BE" smtClean="0"/>
-              <a:t>1</a:t>
+              <a:t>2</a:t>
             </a:fld>
             <a:endParaRPr lang="nl-BE"/>
           </a:p>
@@ -3409,7 +4113,7 @@
 </p:sld>
 </file>
 
-<file path=ppt/slides/slide2.xml><?xml version="1.0" encoding="utf-8"?>
+<file path=ppt/slides/slide3.xml><?xml version="1.0" encoding="utf-8"?>
 <p:sld xmlns:a="http://schemas.openxmlformats.org/drawingml/2006/main" xmlns:r="http://schemas.openxmlformats.org/officeDocument/2006/relationships" xmlns:p="http://schemas.openxmlformats.org/presentationml/2006/main">
   <p:cSld>
     <p:spTree>
@@ -3466,7 +4170,7 @@
           <a:p>
             <a:fld id="{5A209D72-2E9D-49B0-8977-41DCCC66C0BB}" type="slidenum">
               <a:rPr lang="nl-BE" smtClean="0"/>
-              <a:t>2</a:t>
+              <a:t>3</a:t>
             </a:fld>
             <a:endParaRPr lang="nl-BE"/>
           </a:p>
@@ -3524,7 +4228,6 @@
               <a:rPr lang="en-US" sz="2400" i="1" dirty="0"/>
               <a:t>x</a:t>
             </a:r>
-            <a:endParaRPr lang="en-US" sz="2400" i="1" dirty="0"/>
           </a:p>
         </p:txBody>
       </p:sp>
@@ -3562,7 +4265,6 @@
               <a:rPr lang="en-US" dirty="0"/>
               <a:t>: 100 units</a:t>
             </a:r>
-            <a:endParaRPr lang="en-US" dirty="0"/>
           </a:p>
         </p:txBody>
       </p:sp>
@@ -3604,7 +4306,6 @@
               <a:rPr lang="en-US" dirty="0"/>
               <a:t>: 150 units</a:t>
             </a:r>
-            <a:endParaRPr lang="en-US" dirty="0"/>
           </a:p>
         </p:txBody>
       </p:sp>
@@ -3626,7 +4327,7 @@
           <a:graphicData uri="http://schemas.openxmlformats.org/presentationml/2006/ole">
             <mc:AlternateContent xmlns:mc="http://schemas.openxmlformats.org/markup-compatibility/2006">
               <mc:Choice xmlns:v="urn:schemas-microsoft-com:vml" Requires="v">
-                <p:oleObj spid="_x0000_s1026" name="Equation" r:id="rId3" imgW="1206360" imgH="228600" progId="Equation.3">
+                <p:oleObj spid="_x0000_s1031" name="Equation" r:id="rId3" imgW="1206360" imgH="228600" progId="Equation.3">
                   <p:embed/>
                 </p:oleObj>
               </mc:Choice>
@@ -3699,7 +4400,6 @@
               <a:rPr lang="en-US" dirty="0"/>
               <a:t>: 300 units</a:t>
             </a:r>
-            <a:endParaRPr lang="en-US" dirty="0"/>
           </a:p>
         </p:txBody>
       </p:sp>
@@ -3721,7 +4421,7 @@
           <a:graphicData uri="http://schemas.openxmlformats.org/presentationml/2006/ole">
             <mc:AlternateContent xmlns:mc="http://schemas.openxmlformats.org/markup-compatibility/2006">
               <mc:Choice xmlns:v="urn:schemas-microsoft-com:vml" Requires="v">
-                <p:oleObj spid="_x0000_s1027" name="Equation" r:id="rId5" imgW="1295280" imgH="228600" progId="Equation.3">
+                <p:oleObj spid="_x0000_s1032" name="Equation" r:id="rId5" imgW="1295280" imgH="228600" progId="Equation.3">
                   <p:embed/>
                 </p:oleObj>
               </mc:Choice>
@@ -4036,7 +4736,6 @@
                 <a:rPr lang="en-US" dirty="0"/>
                 <a:t>…</a:t>
               </a:r>
-              <a:endParaRPr lang="en-US" dirty="0"/>
             </a:p>
           </p:txBody>
         </p:sp>
@@ -4306,7 +5005,6 @@
                 <a:rPr lang="en-US" dirty="0"/>
                 <a:t>…</a:t>
               </a:r>
-              <a:endParaRPr lang="en-US" dirty="0"/>
             </a:p>
           </p:txBody>
         </p:sp>
@@ -4656,7 +5354,6 @@
                 <a:rPr lang="en-US" dirty="0"/>
                 <a:t>…</a:t>
               </a:r>
-              <a:endParaRPr lang="en-US" dirty="0"/>
             </a:p>
           </p:txBody>
         </p:sp>
@@ -5086,7 +5783,6 @@
                 <a:rPr lang="en-US" dirty="0"/>
                 <a:t>…</a:t>
               </a:r>
-              <a:endParaRPr lang="en-US" dirty="0"/>
             </a:p>
           </p:txBody>
         </p:sp>
@@ -8378,7 +9074,6 @@
               <a:rPr lang="en-US" dirty="0"/>
               <a:t> 28 units</a:t>
             </a:r>
-            <a:endParaRPr lang="en-US" dirty="0"/>
           </a:p>
         </p:txBody>
       </p:sp>
@@ -8400,7 +9095,7 @@
           <a:graphicData uri="http://schemas.openxmlformats.org/presentationml/2006/ole">
             <mc:AlternateContent xmlns:mc="http://schemas.openxmlformats.org/markup-compatibility/2006">
               <mc:Choice xmlns:v="urn:schemas-microsoft-com:vml" Requires="v">
-                <p:oleObj spid="_x0000_s1028" name="Equation" r:id="rId7" imgW="1269720" imgH="228600" progId="Equation.3">
+                <p:oleObj spid="_x0000_s1033" name="Equation" r:id="rId7" imgW="1269720" imgH="228600" progId="Equation.3">
                   <p:embed/>
                 </p:oleObj>
               </mc:Choice>
@@ -8626,25 +9321,7 @@
                 </a:solidFill>
                 <a:sym typeface="Symbol" panose="05050102010706020507" pitchFamily="18" charset="2"/>
               </a:rPr>
-              <a:t> 28  28 + 28 </a:t>
-            </a:r>
-            <a:r>
-              <a:rPr lang="en-US" dirty="0">
-                <a:solidFill>
-                  <a:srgbClr val="C00000"/>
-                </a:solidFill>
-                <a:sym typeface="Symbol" panose="05050102010706020507" pitchFamily="18" charset="2"/>
-              </a:rPr>
-              <a:t> </a:t>
-            </a:r>
-            <a:r>
-              <a:rPr lang="en-US" dirty="0">
-                <a:solidFill>
-                  <a:srgbClr val="C00000"/>
-                </a:solidFill>
-                <a:sym typeface="Symbol" panose="05050102010706020507" pitchFamily="18" charset="2"/>
-              </a:rPr>
-              <a:t>28</a:t>
+              <a:t> 28  28 + 28  28</a:t>
             </a:r>
             <a:br>
               <a:rPr lang="en-US" dirty="0">
@@ -8671,11 +9348,6 @@
               </a:rPr>
               <a:t> unknown variables to determine!</a:t>
             </a:r>
-            <a:endParaRPr lang="en-US" dirty="0">
-              <a:solidFill>
-                <a:srgbClr val="C00000"/>
-              </a:solidFill>
-            </a:endParaRPr>
           </a:p>
         </p:txBody>
       </p:sp>
@@ -8711,7 +9383,7 @@
             <a:graphicData uri="http://schemas.openxmlformats.org/presentationml/2006/ole">
               <mc:AlternateContent xmlns:mc="http://schemas.openxmlformats.org/markup-compatibility/2006">
                 <mc:Choice xmlns:v="urn:schemas-microsoft-com:vml" Requires="v">
-                  <p:oleObj spid="_x0000_s1029" name="Equation" r:id="rId9" imgW="1041120" imgH="203040" progId="Equation.3">
+                  <p:oleObj spid="_x0000_s1034" name="Equation" r:id="rId9" imgW="1041120" imgH="203040" progId="Equation.3">
                     <p:embed/>
                   </p:oleObj>
                 </mc:Choice>
@@ -8764,7 +9436,7 @@
             <a:graphicData uri="http://schemas.openxmlformats.org/presentationml/2006/ole">
               <mc:AlternateContent xmlns:mc="http://schemas.openxmlformats.org/markup-compatibility/2006">
                 <mc:Choice xmlns:v="urn:schemas-microsoft-com:vml" Requires="v">
-                  <p:oleObj spid="_x0000_s1030" name="Equation" r:id="rId11" imgW="419040" imgH="139680" progId="Equation.3">
+                  <p:oleObj spid="_x0000_s1035" name="Equation" r:id="rId11" imgW="419040" imgH="139680" progId="Equation.3">
                     <p:embed/>
                   </p:oleObj>
                 </mc:Choice>
@@ -9247,7 +9919,7 @@
 </p:sld>
 </file>
 
-<file path=ppt/slides/slide3.xml><?xml version="1.0" encoding="utf-8"?>
+<file path=ppt/slides/slide4.xml><?xml version="1.0" encoding="utf-8"?>
 <p:sld xmlns:a="http://schemas.openxmlformats.org/drawingml/2006/main" xmlns:r="http://schemas.openxmlformats.org/officeDocument/2006/relationships" xmlns:p="http://schemas.openxmlformats.org/presentationml/2006/main">
   <p:cSld>
     <p:spTree>
@@ -9456,7 +10128,7 @@
           <a:p>
             <a:fld id="{5A209D72-2E9D-49B0-8977-41DCCC66C0BB}" type="slidenum">
               <a:rPr lang="nl-BE" smtClean="0"/>
-              <a:t>3</a:t>
+              <a:t>4</a:t>
             </a:fld>
             <a:endParaRPr lang="nl-BE"/>
           </a:p>
@@ -9813,7 +10485,7 @@
 </p:sld>
 </file>
 
-<file path=ppt/slides/slide4.xml><?xml version="1.0" encoding="utf-8"?>
+<file path=ppt/slides/slide5.xml><?xml version="1.0" encoding="utf-8"?>
 <p:sld xmlns:a="http://schemas.openxmlformats.org/drawingml/2006/main" xmlns:r="http://schemas.openxmlformats.org/officeDocument/2006/relationships" xmlns:p="http://schemas.openxmlformats.org/presentationml/2006/main">
   <p:cSld>
     <p:spTree>
@@ -9870,7 +10542,7 @@
           <a:p>
             <a:fld id="{5A209D72-2E9D-49B0-8977-41DCCC66C0BB}" type="slidenum">
               <a:rPr lang="nl-BE" smtClean="0"/>
-              <a:t>4</a:t>
+              <a:t>5</a:t>
             </a:fld>
             <a:endParaRPr lang="nl-BE"/>
           </a:p>

</xml_diff>